<commit_message>
Made minor adjustments to slides
</commit_message>
<xml_diff>
--- a/Phase2Docs/Phase2Presentation.pptx
+++ b/Phase2Docs/Phase2Presentation.pptx
@@ -116,7 +116,96 @@
       </a:defRPr>
     </a:lvl9pPr>
   </p:defaultTextStyle>
+  <p:extLst>
+    <p:ext uri="{EFAFB233-063F-42B5-8137-9DF3F51BA10A}">
+      <p15:sldGuideLst xmlns:p15="http://schemas.microsoft.com/office/powerpoint/2012/main"/>
+    </p:ext>
+  </p:extLst>
 </p:presentation>
+</file>
+
+<file path=ppt/revisionInfo.xml><?xml version="1.0" encoding="utf-8"?>
+<p1510:revInfo xmlns:a="http://schemas.openxmlformats.org/drawingml/2006/main" xmlns:r="http://schemas.openxmlformats.org/officeDocument/2006/relationships" xmlns:p1510="http://schemas.microsoft.com/office/powerpoint/2015/10/main">
+  <p1510:revLst>
+    <p1510:client id="{D68FCF8F-9E70-4EA4-9A68-6278C858AB34}" v="1" dt="2025-03-10T19:05:32.249"/>
+  </p1510:revLst>
+</p1510:revInfo>
+</file>
+
+<file path=ppt/changesInfos/changesInfo1.xml><?xml version="1.0" encoding="utf-8"?>
+<pc:chgInfo xmlns:a="http://schemas.openxmlformats.org/drawingml/2006/main" xmlns:r="http://schemas.openxmlformats.org/officeDocument/2006/relationships" xmlns:ac="http://schemas.microsoft.com/office/drawing/2013/main/command" xmlns:pc="http://schemas.microsoft.com/office/powerpoint/2013/main/command">
+  <pc:docChgLst>
+    <pc:chgData name="Ollie Peel" userId="fbbfa503275ca53b" providerId="LiveId" clId="{D68FCF8F-9E70-4EA4-9A68-6278C858AB34}"/>
+    <pc:docChg chg="custSel modSld">
+      <pc:chgData name="Ollie Peel" userId="fbbfa503275ca53b" providerId="LiveId" clId="{D68FCF8F-9E70-4EA4-9A68-6278C858AB34}" dt="2025-03-10T19:05:32.247" v="7" actId="14826"/>
+      <pc:docMkLst>
+        <pc:docMk/>
+      </pc:docMkLst>
+      <pc:sldChg chg="addSp delSp modSp mod">
+        <pc:chgData name="Ollie Peel" userId="fbbfa503275ca53b" providerId="LiveId" clId="{D68FCF8F-9E70-4EA4-9A68-6278C858AB34}" dt="2025-03-10T18:35:19.422" v="6" actId="20577"/>
+        <pc:sldMkLst>
+          <pc:docMk/>
+          <pc:sldMk cId="4267550564" sldId="259"/>
+        </pc:sldMkLst>
+        <pc:spChg chg="add del mod">
+          <ac:chgData name="Ollie Peel" userId="fbbfa503275ca53b" providerId="LiveId" clId="{D68FCF8F-9E70-4EA4-9A68-6278C858AB34}" dt="2025-03-10T18:34:31.021" v="1" actId="478"/>
+          <ac:spMkLst>
+            <pc:docMk/>
+            <pc:sldMk cId="4267550564" sldId="259"/>
+            <ac:spMk id="3" creationId="{A19B0D4A-BACB-F847-C0F3-B3575EC5EABE}"/>
+          </ac:spMkLst>
+        </pc:spChg>
+        <pc:spChg chg="mod">
+          <ac:chgData name="Ollie Peel" userId="fbbfa503275ca53b" providerId="LiveId" clId="{D68FCF8F-9E70-4EA4-9A68-6278C858AB34}" dt="2025-03-10T18:35:19.422" v="6" actId="20577"/>
+          <ac:spMkLst>
+            <pc:docMk/>
+            <pc:sldMk cId="4267550564" sldId="259"/>
+            <ac:spMk id="11" creationId="{08E8FDCF-FBC1-1223-6541-DE840655DC56}"/>
+          </ac:spMkLst>
+        </pc:spChg>
+        <pc:picChg chg="del">
+          <ac:chgData name="Ollie Peel" userId="fbbfa503275ca53b" providerId="LiveId" clId="{D68FCF8F-9E70-4EA4-9A68-6278C858AB34}" dt="2025-03-10T18:34:26.043" v="0" actId="478"/>
+          <ac:picMkLst>
+            <pc:docMk/>
+            <pc:sldMk cId="4267550564" sldId="259"/>
+            <ac:picMk id="6" creationId="{0E73B6E8-9D03-80BA-B6AB-38AB126406B5}"/>
+          </ac:picMkLst>
+        </pc:picChg>
+        <pc:picChg chg="mod">
+          <ac:chgData name="Ollie Peel" userId="fbbfa503275ca53b" providerId="LiveId" clId="{D68FCF8F-9E70-4EA4-9A68-6278C858AB34}" dt="2025-03-10T18:34:40.486" v="3" actId="1076"/>
+          <ac:picMkLst>
+            <pc:docMk/>
+            <pc:sldMk cId="4267550564" sldId="259"/>
+            <ac:picMk id="7" creationId="{954C60A4-A51C-88C5-A3E8-35AFE2D6E99A}"/>
+          </ac:picMkLst>
+        </pc:picChg>
+        <pc:picChg chg="mod">
+          <ac:chgData name="Ollie Peel" userId="fbbfa503275ca53b" providerId="LiveId" clId="{D68FCF8F-9E70-4EA4-9A68-6278C858AB34}" dt="2025-03-10T18:34:35.463" v="2" actId="1076"/>
+          <ac:picMkLst>
+            <pc:docMk/>
+            <pc:sldMk cId="4267550564" sldId="259"/>
+            <ac:picMk id="9" creationId="{868DB08E-E2E5-8A9A-9531-238A004A40DD}"/>
+          </ac:picMkLst>
+        </pc:picChg>
+      </pc:sldChg>
+      <pc:sldChg chg="modSp">
+        <pc:chgData name="Ollie Peel" userId="fbbfa503275ca53b" providerId="LiveId" clId="{D68FCF8F-9E70-4EA4-9A68-6278C858AB34}" dt="2025-03-10T19:05:32.247" v="7" actId="14826"/>
+        <pc:sldMkLst>
+          <pc:docMk/>
+          <pc:sldMk cId="1218077466" sldId="260"/>
+        </pc:sldMkLst>
+        <pc:picChg chg="mod">
+          <ac:chgData name="Ollie Peel" userId="fbbfa503275ca53b" providerId="LiveId" clId="{D68FCF8F-9E70-4EA4-9A68-6278C858AB34}" dt="2025-03-10T19:05:32.247" v="7" actId="14826"/>
+          <ac:picMkLst>
+            <pc:docMk/>
+            <pc:sldMk cId="1218077466" sldId="260"/>
+            <ac:picMk id="5" creationId="{226405A0-6C2C-481F-DA2D-6F334AD6E7D3}"/>
+          </ac:picMkLst>
+        </pc:picChg>
+      </pc:sldChg>
+    </pc:docChg>
+  </pc:docChgLst>
+</pc:chgInfo>
 </file>
 
 <file path=ppt/diagrams/colors1.xml><?xml version="1.0" encoding="utf-8"?>
@@ -3766,7 +3855,7 @@
           <a:p>
             <a:fld id="{5B8A7549-EA31-4155-8B7E-E2C943A44BBF}" type="datetimeFigureOut">
               <a:rPr lang="en-US" smtClean="0"/>
-              <a:t>3/9/2025</a:t>
+              <a:t>3/10/2025</a:t>
             </a:fld>
             <a:endParaRPr lang="en-US"/>
           </a:p>
@@ -3936,7 +4025,7 @@
           <a:p>
             <a:fld id="{5B8A7549-EA31-4155-8B7E-E2C943A44BBF}" type="datetimeFigureOut">
               <a:rPr lang="en-US" smtClean="0"/>
-              <a:t>3/9/2025</a:t>
+              <a:t>3/10/2025</a:t>
             </a:fld>
             <a:endParaRPr lang="en-US"/>
           </a:p>
@@ -4116,7 +4205,7 @@
           <a:p>
             <a:fld id="{5B8A7549-EA31-4155-8B7E-E2C943A44BBF}" type="datetimeFigureOut">
               <a:rPr lang="en-US" smtClean="0"/>
-              <a:t>3/9/2025</a:t>
+              <a:t>3/10/2025</a:t>
             </a:fld>
             <a:endParaRPr lang="en-US"/>
           </a:p>
@@ -4286,7 +4375,7 @@
           <a:p>
             <a:fld id="{5B8A7549-EA31-4155-8B7E-E2C943A44BBF}" type="datetimeFigureOut">
               <a:rPr lang="en-US" smtClean="0"/>
-              <a:t>3/9/2025</a:t>
+              <a:t>3/10/2025</a:t>
             </a:fld>
             <a:endParaRPr lang="en-US"/>
           </a:p>
@@ -4544,7 +4633,7 @@
           <a:p>
             <a:fld id="{5B8A7549-EA31-4155-8B7E-E2C943A44BBF}" type="datetimeFigureOut">
               <a:rPr lang="en-US" smtClean="0"/>
-              <a:t>3/9/2025</a:t>
+              <a:t>3/10/2025</a:t>
             </a:fld>
             <a:endParaRPr lang="en-US"/>
           </a:p>
@@ -4832,7 +4921,7 @@
           <a:p>
             <a:fld id="{5B8A7549-EA31-4155-8B7E-E2C943A44BBF}" type="datetimeFigureOut">
               <a:rPr lang="en-US" smtClean="0"/>
-              <a:t>3/9/2025</a:t>
+              <a:t>3/10/2025</a:t>
             </a:fld>
             <a:endParaRPr lang="en-US"/>
           </a:p>
@@ -5274,7 +5363,7 @@
           <a:p>
             <a:fld id="{5B8A7549-EA31-4155-8B7E-E2C943A44BBF}" type="datetimeFigureOut">
               <a:rPr lang="en-US" smtClean="0"/>
-              <a:t>3/9/2025</a:t>
+              <a:t>3/10/2025</a:t>
             </a:fld>
             <a:endParaRPr lang="en-US"/>
           </a:p>
@@ -5392,7 +5481,7 @@
           <a:p>
             <a:fld id="{5B8A7549-EA31-4155-8B7E-E2C943A44BBF}" type="datetimeFigureOut">
               <a:rPr lang="en-US" smtClean="0"/>
-              <a:t>3/9/2025</a:t>
+              <a:t>3/10/2025</a:t>
             </a:fld>
             <a:endParaRPr lang="en-US"/>
           </a:p>
@@ -5487,7 +5576,7 @@
           <a:p>
             <a:fld id="{5B8A7549-EA31-4155-8B7E-E2C943A44BBF}" type="datetimeFigureOut">
               <a:rPr lang="en-US" smtClean="0"/>
-              <a:t>3/9/2025</a:t>
+              <a:t>3/10/2025</a:t>
             </a:fld>
             <a:endParaRPr lang="en-US"/>
           </a:p>
@@ -5775,7 +5864,7 @@
           <a:p>
             <a:fld id="{5B8A7549-EA31-4155-8B7E-E2C943A44BBF}" type="datetimeFigureOut">
               <a:rPr lang="en-US" smtClean="0"/>
-              <a:t>3/9/2025</a:t>
+              <a:t>3/10/2025</a:t>
             </a:fld>
             <a:endParaRPr lang="en-US"/>
           </a:p>
@@ -6048,7 +6137,7 @@
           <a:p>
             <a:fld id="{5B8A7549-EA31-4155-8B7E-E2C943A44BBF}" type="datetimeFigureOut">
               <a:rPr lang="en-US" smtClean="0"/>
-              <a:t>3/9/2025</a:t>
+              <a:t>3/10/2025</a:t>
             </a:fld>
             <a:endParaRPr lang="en-US"/>
           </a:p>
@@ -6345,7 +6434,7 @@
           <a:p>
             <a:fld id="{5B8A7549-EA31-4155-8B7E-E2C943A44BBF}" type="datetimeFigureOut">
               <a:rPr lang="en-US" smtClean="0"/>
-              <a:t>3/9/2025</a:t>
+              <a:t>3/10/2025</a:t>
             </a:fld>
             <a:endParaRPr lang="en-US"/>
           </a:p>
@@ -14472,10 +14561,10 @@
       </p:grpSpPr>
       <p:pic>
         <p:nvPicPr>
-          <p:cNvPr id="6" name="Content Placeholder 5" descr="A screenshot of a computer&#10;&#10;AI-generated content may be incorrect.">
+          <p:cNvPr id="9" name="Content Placeholder 8" descr="A white background with black dots&#10;&#10;AI-generated content may be incorrect.">
             <a:extLst>
               <a:ext uri="{FF2B5EF4-FFF2-40B4-BE49-F238E27FC236}">
-                <a16:creationId xmlns:a16="http://schemas.microsoft.com/office/drawing/2014/main" id="{0E73B6E8-9D03-80BA-B6AB-38AB126406B5}"/>
+                <a16:creationId xmlns:a16="http://schemas.microsoft.com/office/drawing/2014/main" id="{868DB08E-E2E5-8A9A-9531-238A004A40DD}"/>
               </a:ext>
             </a:extLst>
           </p:cNvPr>
@@ -14483,7 +14572,7 @@
             <a:picLocks noGrp="1" noChangeAspect="1"/>
           </p:cNvPicPr>
           <p:nvPr>
-            <p:ph sz="half" idx="1"/>
+            <p:ph sz="half" idx="2"/>
           </p:nvPr>
         </p:nvPicPr>
         <p:blipFill>
@@ -14500,42 +14589,7 @@
         </p:blipFill>
         <p:spPr>
           <a:xfrm>
-            <a:off x="3791427" y="863600"/>
-            <a:ext cx="2304573" cy="5121275"/>
-          </a:xfrm>
-        </p:spPr>
-      </p:pic>
-      <p:pic>
-        <p:nvPicPr>
-          <p:cNvPr id="9" name="Content Placeholder 8" descr="A white background with black dots&#10;&#10;AI-generated content may be incorrect.">
-            <a:extLst>
-              <a:ext uri="{FF2B5EF4-FFF2-40B4-BE49-F238E27FC236}">
-                <a16:creationId xmlns:a16="http://schemas.microsoft.com/office/drawing/2014/main" id="{868DB08E-E2E5-8A9A-9531-238A004A40DD}"/>
-              </a:ext>
-            </a:extLst>
-          </p:cNvPr>
-          <p:cNvPicPr>
-            <a:picLocks noGrp="1" noChangeAspect="1"/>
-          </p:cNvPicPr>
-          <p:nvPr>
-            <p:ph sz="half" idx="2"/>
-          </p:nvPr>
-        </p:nvPicPr>
-        <p:blipFill>
-          <a:blip r:embed="rId4">
-            <a:extLst>
-              <a:ext uri="{28A0092B-C50C-407E-A947-70E740481C1C}">
-                <a14:useLocalDpi xmlns:a14="http://schemas.microsoft.com/office/drawing/2010/main" val="0"/>
-              </a:ext>
-            </a:extLst>
-          </a:blip>
-          <a:stretch>
-            <a:fillRect/>
-          </a:stretch>
-        </p:blipFill>
-        <p:spPr>
-          <a:xfrm>
-            <a:off x="6467972" y="863600"/>
+            <a:off x="4662922" y="863568"/>
             <a:ext cx="2304573" cy="5121275"/>
           </a:xfrm>
         </p:spPr>
@@ -14555,7 +14609,7 @@
           <p:nvPr/>
         </p:nvPicPr>
         <p:blipFill>
-          <a:blip r:embed="rId5">
+          <a:blip r:embed="rId4">
             <a:extLst>
               <a:ext uri="{28A0092B-C50C-407E-A947-70E740481C1C}">
                 <a14:useLocalDpi xmlns:a14="http://schemas.microsoft.com/office/drawing/2010/main" val="0"/>
@@ -14567,7 +14621,7 @@
         </p:blipFill>
         <p:spPr>
           <a:xfrm>
-            <a:off x="9144517" y="863664"/>
+            <a:off x="8218242" y="863759"/>
             <a:ext cx="2304487" cy="5121084"/>
           </a:xfrm>
           <a:prstGeom prst="rect">
@@ -14855,55 +14909,6 @@
                   <a:schemeClr val="bg1"/>
                 </a:solidFill>
               </a:rPr>
-              <a:t>Activity Drawer:</a:t>
-            </a:r>
-          </a:p>
-          <a:p>
-            <a:pPr>
-              <a:buClr>
-                <a:schemeClr val="bg1"/>
-              </a:buClr>
-            </a:pPr>
-            <a:r>
-              <a:rPr lang="en-US" dirty="0">
-                <a:solidFill>
-                  <a:schemeClr val="bg1"/>
-                </a:solidFill>
-              </a:rPr>
-              <a:t>Displays basic user profile info</a:t>
-            </a:r>
-          </a:p>
-          <a:p>
-            <a:pPr>
-              <a:buClr>
-                <a:schemeClr val="bg1"/>
-              </a:buClr>
-            </a:pPr>
-            <a:r>
-              <a:rPr lang="en-US" dirty="0">
-                <a:solidFill>
-                  <a:schemeClr val="bg1"/>
-                </a:solidFill>
-              </a:rPr>
-              <a:t>Lets users navigate to different pages in the app</a:t>
-            </a:r>
-            <a:endParaRPr lang="en-US" sz="2400" dirty="0">
-              <a:solidFill>
-                <a:schemeClr val="bg1"/>
-              </a:solidFill>
-            </a:endParaRPr>
-          </a:p>
-          <a:p>
-            <a:pPr marL="0" indent="0">
-              <a:buFont typeface="Wingdings 2" pitchFamily="18" charset="2"/>
-              <a:buNone/>
-            </a:pPr>
-            <a:r>
-              <a:rPr lang="en-US" sz="2400" dirty="0">
-                <a:solidFill>
-                  <a:schemeClr val="bg1"/>
-                </a:solidFill>
-              </a:rPr>
               <a:t>Calorie Tracker:</a:t>
             </a:r>
           </a:p>
@@ -15300,8 +15305,8 @@
         </p:blipFill>
         <p:spPr>
           <a:xfrm>
-            <a:off x="1670174" y="1309790"/>
-            <a:ext cx="4889655" cy="4224395"/>
+            <a:off x="2668063" y="1309790"/>
+            <a:ext cx="2893876" cy="4224395"/>
           </a:xfrm>
           <a:prstGeom prst="rect">
             <a:avLst/>

</xml_diff>